<commit_message>
fix typos, update results and relevant algorithms
</commit_message>
<xml_diff>
--- a/report/report.pptx
+++ b/report/report.pptx
@@ -3544,7 +3544,19 @@
           <a:p>
             <a:r>
               <a:rPr lang="pt-PT" dirty="0"/>
-              <a:t>Nas experiências efetuadas, observamos uma melhor eficiência na 2ª variante, em que se divide o produto do peso pelo volume pelo custo do transporte.</a:t>
+              <a:t>Se a diferença entre o número de encomendas e o número de estafetas for significativo, a melhor opção é ordenar as encomendas por ordem decrescente, quer de volume, peso ou volume * peso.</a:t>
+            </a:r>
+          </a:p>
+          <a:p>
+            <a:r>
+              <a:rPr lang="pt-PT" dirty="0"/>
+              <a:t>Caso contrário, a melhor opção é ordená-las por ordem crescente.</a:t>
+            </a:r>
+          </a:p>
+          <a:p>
+            <a:r>
+              <a:rPr lang="pt-PT" dirty="0"/>
+              <a:t>Apesar dos resultados serem semelhantes nos cenários 1 e 2, não podemos concluir que uma otimização do número de estafetas implica uma otimização do lucro da empresa.</a:t>
             </a:r>
           </a:p>
         </p:txBody>
@@ -5544,7 +5556,7 @@
           <a:p>
             <a:r>
               <a:rPr lang="pt-PT" dirty="0"/>
-              <a:t>A cada encomenda entregue está associado uma recompensa.</a:t>
+              <a:t>A cada encomenda entregue está associada uma recompensa.</a:t>
             </a:r>
           </a:p>
           <a:p>
@@ -6752,55 +6764,295 @@
       </p:sp>
       <p:sp>
         <p:nvSpPr>
-          <p:cNvPr id="3" name="Marcador de Posição de Conteúdo 2">
-            <a:extLst>
-              <a:ext uri="{FF2B5EF4-FFF2-40B4-BE49-F238E27FC236}">
-                <a16:creationId xmlns:a16="http://schemas.microsoft.com/office/drawing/2014/main" id="{9467406C-A16F-4E5B-8CA9-2192D2CDADF3}"/>
-              </a:ext>
-            </a:extLst>
-          </p:cNvPr>
-          <p:cNvSpPr>
-            <a:spLocks noGrp="1"/>
-          </p:cNvSpPr>
-          <p:nvPr>
-            <p:ph idx="1"/>
-          </p:nvPr>
-        </p:nvSpPr>
-        <p:spPr/>
-        <p:txBody>
-          <a:bodyPr>
-            <a:normAutofit fontScale="92500" lnSpcReduction="10000"/>
+          <p:cNvPr id="6" name="Marcador de Posição de Conteúdo 2">
+            <a:extLst>
+              <a:ext uri="{FF2B5EF4-FFF2-40B4-BE49-F238E27FC236}">
+                <a16:creationId xmlns:a16="http://schemas.microsoft.com/office/drawing/2014/main" id="{E21703F2-B0DD-4085-8761-A5BFABF0454D}"/>
+              </a:ext>
+            </a:extLst>
+          </p:cNvPr>
+          <p:cNvSpPr txBox="1">
+            <a:spLocks/>
+          </p:cNvSpPr>
+          <p:nvPr/>
+        </p:nvSpPr>
+        <p:spPr>
+          <a:xfrm>
+            <a:off x="838200" y="1524000"/>
+            <a:ext cx="10515600" cy="5210175"/>
+          </a:xfrm>
+          <a:prstGeom prst="rect">
+            <a:avLst/>
+          </a:prstGeom>
+        </p:spPr>
+        <p:txBody>
+          <a:bodyPr vert="horz" lIns="91440" tIns="45720" rIns="91440" bIns="45720" rtlCol="0">
+            <a:normAutofit fontScale="85000" lnSpcReduction="20000"/>
           </a:bodyPr>
-          <a:lstStyle/>
+          <a:lstStyle>
+            <a:lvl1pPr marL="228600" indent="-228600" algn="l" defTabSz="914400" rtl="0" eaLnBrk="1" latinLnBrk="0" hangingPunct="1">
+              <a:lnSpc>
+                <a:spcPct val="90000"/>
+              </a:lnSpc>
+              <a:spcBef>
+                <a:spcPts val="1000"/>
+              </a:spcBef>
+              <a:buFont typeface="Arial" panose="020B0604020202020204" pitchFamily="34" charset="0"/>
+              <a:buChar char="•"/>
+              <a:defRPr sz="2800" kern="1200">
+                <a:solidFill>
+                  <a:schemeClr val="tx1"/>
+                </a:solidFill>
+                <a:latin typeface="+mn-lt"/>
+                <a:ea typeface="+mn-ea"/>
+                <a:cs typeface="+mn-cs"/>
+              </a:defRPr>
+            </a:lvl1pPr>
+            <a:lvl2pPr marL="685800" indent="-228600" algn="l" defTabSz="914400" rtl="0" eaLnBrk="1" latinLnBrk="0" hangingPunct="1">
+              <a:lnSpc>
+                <a:spcPct val="90000"/>
+              </a:lnSpc>
+              <a:spcBef>
+                <a:spcPts val="500"/>
+              </a:spcBef>
+              <a:buFont typeface="Arial" panose="020B0604020202020204" pitchFamily="34" charset="0"/>
+              <a:buChar char="•"/>
+              <a:defRPr sz="2400" kern="1200">
+                <a:solidFill>
+                  <a:schemeClr val="tx1"/>
+                </a:solidFill>
+                <a:latin typeface="+mn-lt"/>
+                <a:ea typeface="+mn-ea"/>
+                <a:cs typeface="+mn-cs"/>
+              </a:defRPr>
+            </a:lvl2pPr>
+            <a:lvl3pPr marL="1143000" indent="-228600" algn="l" defTabSz="914400" rtl="0" eaLnBrk="1" latinLnBrk="0" hangingPunct="1">
+              <a:lnSpc>
+                <a:spcPct val="90000"/>
+              </a:lnSpc>
+              <a:spcBef>
+                <a:spcPts val="500"/>
+              </a:spcBef>
+              <a:buFont typeface="Arial" panose="020B0604020202020204" pitchFamily="34" charset="0"/>
+              <a:buChar char="•"/>
+              <a:defRPr sz="2000" kern="1200">
+                <a:solidFill>
+                  <a:schemeClr val="tx1"/>
+                </a:solidFill>
+                <a:latin typeface="+mn-lt"/>
+                <a:ea typeface="+mn-ea"/>
+                <a:cs typeface="+mn-cs"/>
+              </a:defRPr>
+            </a:lvl3pPr>
+            <a:lvl4pPr marL="1600200" indent="-228600" algn="l" defTabSz="914400" rtl="0" eaLnBrk="1" latinLnBrk="0" hangingPunct="1">
+              <a:lnSpc>
+                <a:spcPct val="90000"/>
+              </a:lnSpc>
+              <a:spcBef>
+                <a:spcPts val="500"/>
+              </a:spcBef>
+              <a:buFont typeface="Arial" panose="020B0604020202020204" pitchFamily="34" charset="0"/>
+              <a:buChar char="•"/>
+              <a:defRPr sz="1800" kern="1200">
+                <a:solidFill>
+                  <a:schemeClr val="tx1"/>
+                </a:solidFill>
+                <a:latin typeface="+mn-lt"/>
+                <a:ea typeface="+mn-ea"/>
+                <a:cs typeface="+mn-cs"/>
+              </a:defRPr>
+            </a:lvl4pPr>
+            <a:lvl5pPr marL="2057400" indent="-228600" algn="l" defTabSz="914400" rtl="0" eaLnBrk="1" latinLnBrk="0" hangingPunct="1">
+              <a:lnSpc>
+                <a:spcPct val="90000"/>
+              </a:lnSpc>
+              <a:spcBef>
+                <a:spcPts val="500"/>
+              </a:spcBef>
+              <a:buFont typeface="Arial" panose="020B0604020202020204" pitchFamily="34" charset="0"/>
+              <a:buChar char="•"/>
+              <a:defRPr sz="1800" kern="1200">
+                <a:solidFill>
+                  <a:schemeClr val="tx1"/>
+                </a:solidFill>
+                <a:latin typeface="+mn-lt"/>
+                <a:ea typeface="+mn-ea"/>
+                <a:cs typeface="+mn-cs"/>
+              </a:defRPr>
+            </a:lvl5pPr>
+            <a:lvl6pPr marL="2514600" indent="-228600" algn="l" defTabSz="914400" rtl="0" eaLnBrk="1" latinLnBrk="0" hangingPunct="1">
+              <a:lnSpc>
+                <a:spcPct val="90000"/>
+              </a:lnSpc>
+              <a:spcBef>
+                <a:spcPts val="500"/>
+              </a:spcBef>
+              <a:buFont typeface="Arial" panose="020B0604020202020204" pitchFamily="34" charset="0"/>
+              <a:buChar char="•"/>
+              <a:defRPr sz="1800" kern="1200">
+                <a:solidFill>
+                  <a:schemeClr val="tx1"/>
+                </a:solidFill>
+                <a:latin typeface="+mn-lt"/>
+                <a:ea typeface="+mn-ea"/>
+                <a:cs typeface="+mn-cs"/>
+              </a:defRPr>
+            </a:lvl6pPr>
+            <a:lvl7pPr marL="2971800" indent="-228600" algn="l" defTabSz="914400" rtl="0" eaLnBrk="1" latinLnBrk="0" hangingPunct="1">
+              <a:lnSpc>
+                <a:spcPct val="90000"/>
+              </a:lnSpc>
+              <a:spcBef>
+                <a:spcPts val="500"/>
+              </a:spcBef>
+              <a:buFont typeface="Arial" panose="020B0604020202020204" pitchFamily="34" charset="0"/>
+              <a:buChar char="•"/>
+              <a:defRPr sz="1800" kern="1200">
+                <a:solidFill>
+                  <a:schemeClr val="tx1"/>
+                </a:solidFill>
+                <a:latin typeface="+mn-lt"/>
+                <a:ea typeface="+mn-ea"/>
+                <a:cs typeface="+mn-cs"/>
+              </a:defRPr>
+            </a:lvl7pPr>
+            <a:lvl8pPr marL="3429000" indent="-228600" algn="l" defTabSz="914400" rtl="0" eaLnBrk="1" latinLnBrk="0" hangingPunct="1">
+              <a:lnSpc>
+                <a:spcPct val="90000"/>
+              </a:lnSpc>
+              <a:spcBef>
+                <a:spcPts val="500"/>
+              </a:spcBef>
+              <a:buFont typeface="Arial" panose="020B0604020202020204" pitchFamily="34" charset="0"/>
+              <a:buChar char="•"/>
+              <a:defRPr sz="1800" kern="1200">
+                <a:solidFill>
+                  <a:schemeClr val="tx1"/>
+                </a:solidFill>
+                <a:latin typeface="+mn-lt"/>
+                <a:ea typeface="+mn-ea"/>
+                <a:cs typeface="+mn-cs"/>
+              </a:defRPr>
+            </a:lvl8pPr>
+            <a:lvl9pPr marL="3886200" indent="-228600" algn="l" defTabSz="914400" rtl="0" eaLnBrk="1" latinLnBrk="0" hangingPunct="1">
+              <a:lnSpc>
+                <a:spcPct val="90000"/>
+              </a:lnSpc>
+              <a:spcBef>
+                <a:spcPts val="500"/>
+              </a:spcBef>
+              <a:buFont typeface="Arial" panose="020B0604020202020204" pitchFamily="34" charset="0"/>
+              <a:buChar char="•"/>
+              <a:defRPr sz="1800" kern="1200">
+                <a:solidFill>
+                  <a:schemeClr val="tx1"/>
+                </a:solidFill>
+                <a:latin typeface="+mn-lt"/>
+                <a:ea typeface="+mn-ea"/>
+                <a:cs typeface="+mn-cs"/>
+              </a:defRPr>
+            </a:lvl9pPr>
+          </a:lstStyle>
           <a:p>
             <a:r>
               <a:rPr lang="pt-PT" dirty="0"/>
-              <a:t>Na primeira opção, ordenamos as encomendas e os estafetas por ordem decrescente de volume.</a:t>
-            </a:r>
-          </a:p>
-          <a:p>
+              <a:t>Implementamos 3 variantes para este cenário.</a:t>
+            </a:r>
+          </a:p>
+          <a:p>
+            <a:pPr marL="0" indent="0">
+              <a:buFont typeface="Arial" panose="020B0604020202020204" pitchFamily="34" charset="0"/>
+              <a:buNone/>
+            </a:pPr>
+            <a:endParaRPr lang="pt-PT" dirty="0"/>
+          </a:p>
+          <a:p>
+            <a:pPr marL="514350" indent="-514350">
+              <a:buFont typeface="+mj-lt"/>
+              <a:buAutoNum type="arabicPeriod"/>
+            </a:pPr>
             <a:r>
               <a:rPr lang="pt-PT" dirty="0"/>
-              <a:t>Na segunda opção, ordenamos as encomendas e os estafetas por ordem decrescente de peso.</a:t>
-            </a:r>
-          </a:p>
-          <a:p>
+              <a:t>Na primeira, ordenamos os estafetas por ordem decrescente de volume e as encomendas por:</a:t>
+            </a:r>
+          </a:p>
+          <a:p>
+            <a:pPr lvl="1"/>
             <a:r>
               <a:rPr lang="pt-PT" dirty="0"/>
-              <a:t>Na terceira opção, ordenamos as encomendas e os estafetas por ordem decrescente de peso * volume.</a:t>
-            </a:r>
-          </a:p>
-          <a:p>
+              <a:t>Ordem crescente de volume</a:t>
+            </a:r>
+          </a:p>
+          <a:p>
+            <a:pPr lvl="1"/>
             <a:r>
               <a:rPr lang="pt-PT" dirty="0"/>
-              <a:t>Na quarta e quinta opções, apenas trocamos a ordem pela qual as encomendas são ordenadas.</a:t>
-            </a:r>
-          </a:p>
-          <a:p>
+              <a:t>Ordem decrescente de volume</a:t>
+            </a:r>
+          </a:p>
+          <a:p>
+            <a:pPr marL="514350" indent="-514350">
+              <a:buFont typeface="+mj-lt"/>
+              <a:buAutoNum type="arabicPeriod"/>
+            </a:pPr>
             <a:r>
               <a:rPr lang="pt-PT" dirty="0"/>
-              <a:t>Atribuímos encomendas a um estafeta até este não conseguir transportar mais, até acabarem os estafetas ou as encomendas.</a:t>
-            </a:r>
+              <a:t>Na segunda, ordenamos os estafetas por ordem decrescente de peso e as encomendas por:</a:t>
+            </a:r>
+          </a:p>
+          <a:p>
+            <a:pPr lvl="1"/>
+            <a:r>
+              <a:rPr lang="pt-PT" dirty="0"/>
+              <a:t>Ordem crescente de peso</a:t>
+            </a:r>
+          </a:p>
+          <a:p>
+            <a:pPr lvl="1"/>
+            <a:r>
+              <a:rPr lang="pt-PT" dirty="0"/>
+              <a:t>Ordem decrescente de peso</a:t>
+            </a:r>
+          </a:p>
+          <a:p>
+            <a:pPr marL="514350" indent="-514350">
+              <a:buFont typeface="+mj-lt"/>
+              <a:buAutoNum type="arabicPeriod"/>
+            </a:pPr>
+            <a:r>
+              <a:rPr lang="pt-PT" dirty="0"/>
+              <a:t>Na terceira, ordenamos os estafetas por ordem decrescente de</a:t>
+            </a:r>
+          </a:p>
+          <a:p>
+            <a:pPr marL="0" indent="0">
+              <a:buNone/>
+            </a:pPr>
+            <a:r>
+              <a:rPr lang="pt-PT" dirty="0"/>
+              <a:t>        peso * volume e as encomendas por:</a:t>
+            </a:r>
+          </a:p>
+          <a:p>
+            <a:pPr lvl="1"/>
+            <a:r>
+              <a:rPr lang="pt-PT" dirty="0"/>
+              <a:t>Ordem crescente de peso * volume</a:t>
+            </a:r>
+          </a:p>
+          <a:p>
+            <a:pPr lvl="1"/>
+            <a:r>
+              <a:rPr lang="pt-PT" dirty="0"/>
+              <a:t>Ordem decrescente de peso * volume</a:t>
+            </a:r>
+          </a:p>
+          <a:p>
+            <a:pPr marL="457200" lvl="1" indent="0">
+              <a:buFont typeface="Arial" panose="020B0604020202020204" pitchFamily="34" charset="0"/>
+              <a:buNone/>
+            </a:pPr>
+            <a:endParaRPr lang="pt-PT" dirty="0"/>
           </a:p>
           <a:p>
             <a:r>
@@ -7015,15 +7267,13 @@
           <a:p>
             <a:r>
               <a:rPr lang="pt-PT" dirty="0"/>
-              <a:t>Os melhores resultados foram obtidas com a ordenação das encomendas por ordem decrescente, não havendo diferenças notáveis entre ordenar por volume ou por peso nos </a:t>
-            </a:r>
-            <a:r>
-              <a:rPr lang="pt-PT" dirty="0" err="1"/>
-              <a:t>datasets</a:t>
-            </a:r>
+              <a:t>Se a diferença entre o número de encomendas e o número de estafetas for significativo, a melhor opção é ordenar as encomendas por ordem decrescente, quer de volume, peso ou volume * peso.</a:t>
+            </a:r>
+          </a:p>
+          <a:p>
             <a:r>
               <a:rPr lang="pt-PT" dirty="0"/>
-              <a:t> analisados.</a:t>
+              <a:t>Caso contrário, a melhor opção é ordená-las por ordem crescente.</a:t>
             </a:r>
           </a:p>
         </p:txBody>
@@ -7086,8 +7336,8 @@
           </a:p>
         </p:txBody>
       </p:sp>
-      <mc:AlternateContent xmlns:mc="http://schemas.openxmlformats.org/markup-compatibility/2006" xmlns:a14="http://schemas.microsoft.com/office/drawing/2010/main">
-        <mc:Choice Requires="a14">
+      <mc:AlternateContent xmlns:mc="http://schemas.openxmlformats.org/markup-compatibility/2006">
+        <mc:Choice xmlns:a14="http://schemas.microsoft.com/office/drawing/2010/main" Requires="a14">
           <p:sp>
             <p:nvSpPr>
               <p:cNvPr id="3" name="Marcador de Posição de Conteúdo 2">
@@ -7189,7 +7439,7 @@
                 </a14:m>
                 <a:r>
                   <a:rPr lang="pt-PT" dirty="0"/>
-                  <a:t>, em que L representa o lucro da encomenda i entregue pelo estafeta j.</a:t>
+                  <a:t>, em que L representa o lucro da encomenda i entregue pelo estafeta k.</a:t>
                 </a:r>
               </a:p>
               <a:p>
@@ -7271,7 +7521,7 @@
             </p:txBody>
           </p:sp>
         </mc:Choice>
-        <mc:Fallback xmlns="">
+        <mc:Fallback>
           <p:sp>
             <p:nvSpPr>
               <p:cNvPr id="3" name="Marcador de Posição de Conteúdo 2">
@@ -8170,35 +8420,115 @@
             <p:ph idx="1"/>
           </p:nvPr>
         </p:nvSpPr>
-        <p:spPr/>
+        <p:spPr>
+          <a:xfrm>
+            <a:off x="838200" y="1466850"/>
+            <a:ext cx="10515600" cy="5210175"/>
+          </a:xfrm>
+        </p:spPr>
         <p:txBody>
           <a:bodyPr>
-            <a:normAutofit fontScale="92500" lnSpcReduction="10000"/>
+            <a:normAutofit fontScale="85000" lnSpcReduction="20000"/>
           </a:bodyPr>
           <a:lstStyle/>
           <a:p>
             <a:r>
               <a:rPr lang="pt-PT" dirty="0"/>
-              <a:t>Implementamos 2 variantes para este cenário.</a:t>
-            </a:r>
-          </a:p>
-          <a:p>
+              <a:t>Implementamos 3 variantes para este cenário.</a:t>
+            </a:r>
+          </a:p>
+          <a:p>
+            <a:pPr marL="0" indent="0">
+              <a:buNone/>
+            </a:pPr>
+            <a:endParaRPr lang="pt-PT" dirty="0"/>
+          </a:p>
+          <a:p>
+            <a:pPr marL="514350" indent="-514350">
+              <a:buFont typeface="+mj-lt"/>
+              <a:buAutoNum type="arabicPeriod"/>
+            </a:pPr>
             <a:r>
               <a:rPr lang="pt-PT" dirty="0"/>
-              <a:t>Na primeira, ordenamos as encomendas por ordem decrescente pela fórmula: peso * volume * recompensa. Ordenamos os estafetas por ordem crescente pela fórmula: peso * volume * custo.</a:t>
-            </a:r>
-          </a:p>
-          <a:p>
+              <a:t>Na primeira, ordenamos os estafetas por ordem decrescente de volume / custo e as encomendas por:</a:t>
+            </a:r>
+          </a:p>
+          <a:p>
+            <a:pPr lvl="1"/>
             <a:r>
               <a:rPr lang="pt-PT" dirty="0"/>
-              <a:t>Na segunda, ordenamos as encomendas por ordem crescente pela fórmula: peso * volume / recompensa. Ordenamos os estafetas por ordem decrescente pela fórmula: peso * volume / custo.</a:t>
-            </a:r>
-          </a:p>
-          <a:p>
+              <a:t>Ordem crescente de volume</a:t>
+            </a:r>
+          </a:p>
+          <a:p>
+            <a:pPr lvl="1"/>
             <a:r>
               <a:rPr lang="pt-PT" dirty="0"/>
-              <a:t>Nas duas variantes, atribuímos encomendas a estafetas até estes não poderem transportar mais, até as encomendas ou o estafetas se esgotarem.</a:t>
-            </a:r>
+              <a:t>Ordem decrescente de volume</a:t>
+            </a:r>
+          </a:p>
+          <a:p>
+            <a:pPr marL="514350" indent="-514350">
+              <a:buFont typeface="+mj-lt"/>
+              <a:buAutoNum type="arabicPeriod"/>
+            </a:pPr>
+            <a:r>
+              <a:rPr lang="pt-PT" dirty="0"/>
+              <a:t>Na segunda, ordenamos os estafetas por ordem decrescente de peso / custo e as encomendas por:</a:t>
+            </a:r>
+          </a:p>
+          <a:p>
+            <a:pPr lvl="1"/>
+            <a:r>
+              <a:rPr lang="pt-PT" dirty="0"/>
+              <a:t>Ordem crescente de peso</a:t>
+            </a:r>
+          </a:p>
+          <a:p>
+            <a:pPr lvl="1"/>
+            <a:r>
+              <a:rPr lang="pt-PT" dirty="0"/>
+              <a:t>Ordem decrescente de peso</a:t>
+            </a:r>
+          </a:p>
+          <a:p>
+            <a:pPr marL="514350" indent="-514350">
+              <a:buFont typeface="+mj-lt"/>
+              <a:buAutoNum type="arabicPeriod"/>
+            </a:pPr>
+            <a:r>
+              <a:rPr lang="pt-PT" dirty="0"/>
+              <a:t>Na terceira, ordenamos os estafetas por ordem decrescente de </a:t>
+            </a:r>
+          </a:p>
+          <a:p>
+            <a:pPr marL="0" indent="0">
+              <a:buNone/>
+            </a:pPr>
+            <a:r>
+              <a:rPr lang="pt-PT" dirty="0"/>
+              <a:t>        peso * volume / custo e as encomendas por:</a:t>
+            </a:r>
+          </a:p>
+          <a:p>
+            <a:pPr lvl="1"/>
+            <a:r>
+              <a:rPr lang="pt-PT" dirty="0"/>
+              <a:t>Ordem crescente de peso * volume</a:t>
+            </a:r>
+          </a:p>
+          <a:p>
+            <a:pPr lvl="1"/>
+            <a:r>
+              <a:rPr lang="pt-PT" dirty="0"/>
+              <a:t>Ordem decrescente de peso * volume</a:t>
+            </a:r>
+          </a:p>
+          <a:p>
+            <a:pPr marL="457200" lvl="1" indent="0">
+              <a:buNone/>
+            </a:pPr>
+            <a:endParaRPr lang="pt-PT" dirty="0"/>
           </a:p>
           <a:p>
             <a:r>

</xml_diff>